<commit_message>
Changes to RiscV links and memory building information
</commit_message>
<xml_diff>
--- a/documentation/summer_2019.pptx
+++ b/documentation/summer_2019.pptx
@@ -16042,7 +16042,7 @@
         <p:spPr/>
         <p:txBody>
           <a:bodyPr>
-            <a:normAutofit fontScale="55000" lnSpcReduction="20000"/>
+            <a:normAutofit fontScale="47500" lnSpcReduction="20000"/>
           </a:bodyPr>
           <a:lstStyle/>
           <a:p>
@@ -16313,6 +16313,41 @@
             </a:r>
           </a:p>
           <a:p>
+            <a:pPr lvl="1"/>
+            <a:r>
+              <a:rPr lang="en-US" dirty="0"/>
+              <a:t>/pkgs/</a:t>
+            </a:r>
+            <a:r>
+              <a:rPr lang="en-US" dirty="0" err="1"/>
+              <a:t>riscv</a:t>
+            </a:r>
+            <a:r>
+              <a:rPr lang="en-US" dirty="0"/>
+              <a:t>/rocket-chip/</a:t>
+            </a:r>
+            <a:r>
+              <a:rPr lang="en-US" dirty="0" err="1"/>
+              <a:t>src</a:t>
+            </a:r>
+            <a:r>
+              <a:rPr lang="en-US" dirty="0"/>
+              <a:t>/main/resources/</a:t>
+            </a:r>
+            <a:r>
+              <a:rPr lang="en-US" dirty="0" err="1"/>
+              <a:t>vsrc</a:t>
+            </a:r>
+            <a:endParaRPr lang="en-US" dirty="0"/>
+          </a:p>
+          <a:p>
+            <a:pPr lvl="1"/>
+            <a:r>
+              <a:rPr lang="en-US" dirty="0"/>
+              <a:t>SYNTHESIS `define needs to be set</a:t>
+            </a:r>
+          </a:p>
+          <a:p>
             <a:r>
               <a:rPr lang="en-US" dirty="0"/>
               <a:t>Scala example (but don’t dig here too much.  Other items more important)</a:t>
@@ -16395,10 +16430,12 @@
             </a:r>
             <a:r>
               <a:rPr lang="en-US" dirty="0"/>
-              <a:t>?  Documentation?</a:t>
-            </a:r>
-          </a:p>
-          <a:p>
+              <a:t>?  </a:t>
+            </a:r>
+            <a:r>
+              <a:rPr lang="en-US"/>
+              <a:t>Documentation?</a:t>
+            </a:r>
             <a:endParaRPr lang="en-US" dirty="0"/>
           </a:p>
         </p:txBody>
@@ -16519,7 +16556,7 @@
         <p:spPr/>
         <p:txBody>
           <a:bodyPr>
-            <a:normAutofit fontScale="77500" lnSpcReduction="20000"/>
+            <a:normAutofit fontScale="62500" lnSpcReduction="20000"/>
           </a:bodyPr>
           <a:lstStyle/>
           <a:p>
@@ -16588,6 +16625,42 @@
             <a:r>
               <a:rPr lang="en-US" dirty="0"/>
               <a:t>Memories will not exactly fit needs.  You will need to combine or make larger.</a:t>
+            </a:r>
+          </a:p>
+          <a:p>
+            <a:pPr lvl="1"/>
+            <a:r>
+              <a:rPr lang="en-US" dirty="0"/>
+              <a:t>First memory is 512x256 bits</a:t>
+            </a:r>
+          </a:p>
+          <a:p>
+            <a:pPr lvl="1"/>
+            <a:r>
+              <a:rPr lang="en-US" dirty="0"/>
+              <a:t>On the first memory, there are write masks for each byte.  Our memories don’t support byte masks.  Make 32 separate memory for each.</a:t>
+            </a:r>
+          </a:p>
+          <a:p>
+            <a:pPr lvl="1"/>
+            <a:r>
+              <a:rPr lang="en-US" dirty="0"/>
+              <a:t>512 deep and 128 is the max </a:t>
+            </a:r>
+            <a:r>
+              <a:rPr lang="en-US" dirty="0" err="1"/>
+              <a:t>sram</a:t>
+            </a:r>
+            <a:r>
+              <a:rPr lang="en-US" dirty="0"/>
+              <a:t> compiler depth, so that will take 4.</a:t>
+            </a:r>
+          </a:p>
+          <a:p>
+            <a:pPr lvl="1"/>
+            <a:r>
+              <a:rPr lang="en-US" dirty="0"/>
+              <a:t>So initial thoughts are 32x4=128 separate 128x8 memories wrapped together.</a:t>
             </a:r>
           </a:p>
           <a:p>

</xml_diff>